<commit_message>
added classnotes and ADLS slide
</commit_message>
<xml_diff>
--- a/Slides/Azure Data Lake Gen2.pptx
+++ b/Slides/Azure Data Lake Gen2.pptx
@@ -128,6 +128,11 @@
       </a:defRPr>
     </a:lvl9pPr>
   </p:defaultTextStyle>
+  <p:extLst>
+    <p:ext uri="{EFAFB233-063F-42B5-8137-9DF3F51BA10A}">
+      <p15:sldGuideLst xmlns:p15="http://schemas.microsoft.com/office/powerpoint/2012/main"/>
+    </p:ext>
+  </p:extLst>
 </p:presentation>
 </file>
 
@@ -280,7 +285,7 @@
           <a:p>
             <a:fld id="{C4D45232-753D-4BF0-8A89-12EA0B172E71}" type="datetimeFigureOut">
               <a:rPr lang="en-IN" smtClean="0"/>
-              <a:t>03-10-2022</a:t>
+              <a:t>07-10-2022</a:t>
             </a:fld>
             <a:endParaRPr lang="en-IN"/>
           </a:p>
@@ -480,7 +485,7 @@
           <a:p>
             <a:fld id="{C4D45232-753D-4BF0-8A89-12EA0B172E71}" type="datetimeFigureOut">
               <a:rPr lang="en-IN" smtClean="0"/>
-              <a:t>03-10-2022</a:t>
+              <a:t>07-10-2022</a:t>
             </a:fld>
             <a:endParaRPr lang="en-IN"/>
           </a:p>
@@ -690,7 +695,7 @@
           <a:p>
             <a:fld id="{C4D45232-753D-4BF0-8A89-12EA0B172E71}" type="datetimeFigureOut">
               <a:rPr lang="en-IN" smtClean="0"/>
-              <a:t>03-10-2022</a:t>
+              <a:t>07-10-2022</a:t>
             </a:fld>
             <a:endParaRPr lang="en-IN"/>
           </a:p>
@@ -890,7 +895,7 @@
           <a:p>
             <a:fld id="{C4D45232-753D-4BF0-8A89-12EA0B172E71}" type="datetimeFigureOut">
               <a:rPr lang="en-IN" smtClean="0"/>
-              <a:t>03-10-2022</a:t>
+              <a:t>07-10-2022</a:t>
             </a:fld>
             <a:endParaRPr lang="en-IN"/>
           </a:p>
@@ -1166,7 +1171,7 @@
           <a:p>
             <a:fld id="{C4D45232-753D-4BF0-8A89-12EA0B172E71}" type="datetimeFigureOut">
               <a:rPr lang="en-IN" smtClean="0"/>
-              <a:t>03-10-2022</a:t>
+              <a:t>07-10-2022</a:t>
             </a:fld>
             <a:endParaRPr lang="en-IN"/>
           </a:p>
@@ -1434,7 +1439,7 @@
           <a:p>
             <a:fld id="{C4D45232-753D-4BF0-8A89-12EA0B172E71}" type="datetimeFigureOut">
               <a:rPr lang="en-IN" smtClean="0"/>
-              <a:t>03-10-2022</a:t>
+              <a:t>07-10-2022</a:t>
             </a:fld>
             <a:endParaRPr lang="en-IN"/>
           </a:p>
@@ -1849,7 +1854,7 @@
           <a:p>
             <a:fld id="{C4D45232-753D-4BF0-8A89-12EA0B172E71}" type="datetimeFigureOut">
               <a:rPr lang="en-IN" smtClean="0"/>
-              <a:t>03-10-2022</a:t>
+              <a:t>07-10-2022</a:t>
             </a:fld>
             <a:endParaRPr lang="en-IN"/>
           </a:p>
@@ -1991,7 +1996,7 @@
           <a:p>
             <a:fld id="{C4D45232-753D-4BF0-8A89-12EA0B172E71}" type="datetimeFigureOut">
               <a:rPr lang="en-IN" smtClean="0"/>
-              <a:t>03-10-2022</a:t>
+              <a:t>07-10-2022</a:t>
             </a:fld>
             <a:endParaRPr lang="en-IN"/>
           </a:p>
@@ -2104,7 +2109,7 @@
           <a:p>
             <a:fld id="{C4D45232-753D-4BF0-8A89-12EA0B172E71}" type="datetimeFigureOut">
               <a:rPr lang="en-IN" smtClean="0"/>
-              <a:t>03-10-2022</a:t>
+              <a:t>07-10-2022</a:t>
             </a:fld>
             <a:endParaRPr lang="en-IN"/>
           </a:p>
@@ -2417,7 +2422,7 @@
           <a:p>
             <a:fld id="{C4D45232-753D-4BF0-8A89-12EA0B172E71}" type="datetimeFigureOut">
               <a:rPr lang="en-IN" smtClean="0"/>
-              <a:t>03-10-2022</a:t>
+              <a:t>07-10-2022</a:t>
             </a:fld>
             <a:endParaRPr lang="en-IN"/>
           </a:p>
@@ -2706,7 +2711,7 @@
           <a:p>
             <a:fld id="{C4D45232-753D-4BF0-8A89-12EA0B172E71}" type="datetimeFigureOut">
               <a:rPr lang="en-IN" smtClean="0"/>
-              <a:t>03-10-2022</a:t>
+              <a:t>07-10-2022</a:t>
             </a:fld>
             <a:endParaRPr lang="en-IN"/>
           </a:p>
@@ -2949,7 +2954,7 @@
           <a:p>
             <a:fld id="{C4D45232-753D-4BF0-8A89-12EA0B172E71}" type="datetimeFigureOut">
               <a:rPr lang="en-IN" smtClean="0"/>
-              <a:t>03-10-2022</a:t>
+              <a:t>07-10-2022</a:t>
             </a:fld>
             <a:endParaRPr lang="en-IN"/>
           </a:p>

</xml_diff>